<commit_message>
updating words and PNGs of the auditability doc.
</commit_message>
<xml_diff>
--- a/adocs/documentation/src/main/pptx/LeaseTermAndInvoiceItems.pptx
+++ b/adocs/documentation/src/main/pptx/LeaseTermAndInvoiceItems.pptx
@@ -3104,7 +3104,7 @@
         </p:nvSpPr>
         <p:spPr>
           <a:xfrm>
-            <a:off x="2555776" y="116632"/>
+            <a:off x="3563888" y="116632"/>
             <a:ext cx="1728192" cy="600634"/>
           </a:xfrm>
           <a:prstGeom prst="rect">
@@ -3148,7 +3148,7 @@
         </p:nvSpPr>
         <p:spPr>
           <a:xfrm>
-            <a:off x="1115616" y="836712"/>
+            <a:off x="2123728" y="836712"/>
             <a:ext cx="1728192" cy="600634"/>
           </a:xfrm>
           <a:prstGeom prst="rect">
@@ -3212,7 +3212,7 @@
         </p:nvSpPr>
         <p:spPr>
           <a:xfrm>
-            <a:off x="4067944" y="836712"/>
+            <a:off x="5076056" y="836712"/>
             <a:ext cx="1728192" cy="600634"/>
           </a:xfrm>
           <a:prstGeom prst="rect">
@@ -3422,7 +3422,7 @@
         <p:spPr>
           <a:xfrm>
             <a:off x="323528" y="1628800"/>
-            <a:ext cx="1728192" cy="600634"/>
+            <a:ext cx="8424936" cy="600634"/>
           </a:xfrm>
           <a:prstGeom prst="rect">
             <a:avLst/>
@@ -3451,10 +3451,6 @@
           <a:p>
             <a:pPr algn="ctr"/>
             <a:r>
-              <a:rPr lang="en-GB" sz="1600" dirty="0" smtClean="0"/>
-              <a:t>Q1 </a:t>
-            </a:r>
-            <a:r>
               <a:rPr lang="en-GB" sz="1600" dirty="0" err="1" smtClean="0"/>
               <a:t>LeaseTerm</a:t>
             </a:r>
@@ -3731,7 +3727,7 @@
         <p:spPr>
           <a:xfrm>
             <a:off x="323528" y="2348880"/>
-            <a:ext cx="1728192" cy="600634"/>
+            <a:ext cx="8424936" cy="600634"/>
           </a:xfrm>
           <a:prstGeom prst="rect">
             <a:avLst/>
@@ -3760,250 +3756,6 @@
           <a:p>
             <a:pPr algn="ctr"/>
             <a:r>
-              <a:rPr lang="en-GB" sz="1600" dirty="0" smtClean="0"/>
-              <a:t>Q1 </a:t>
-            </a:r>
-            <a:r>
-              <a:rPr lang="en-GB" sz="1600" dirty="0" err="1" smtClean="0"/>
-              <a:t>LeaseTerm</a:t>
-            </a:r>
-            <a:r>
-              <a:rPr lang="en-GB" sz="1600" dirty="0"/>
-              <a:t/>
-            </a:r>
-            <a:br>
-              <a:rPr lang="en-GB" sz="1600" dirty="0"/>
-            </a:br>
-            <a:r>
-              <a:rPr lang="en-GB" sz="1600" dirty="0" err="1" smtClean="0"/>
-              <a:t>ForServiceCharge</a:t>
-            </a:r>
-            <a:endParaRPr lang="en-GB" sz="1600" dirty="0"/>
-          </a:p>
-        </p:txBody>
-      </p:sp>
-      <p:sp>
-        <p:nvSpPr>
-          <p:cNvPr id="30" name="Rectangle 29"/>
-          <p:cNvSpPr/>
-          <p:nvPr/>
-        </p:nvSpPr>
-        <p:spPr>
-          <a:xfrm>
-            <a:off x="2699792" y="1628800"/>
-            <a:ext cx="1728192" cy="600634"/>
-          </a:xfrm>
-          <a:prstGeom prst="rect">
-            <a:avLst/>
-          </a:prstGeom>
-          <a:ln/>
-        </p:spPr>
-        <p:style>
-          <a:lnRef idx="2">
-            <a:schemeClr val="accent3">
-              <a:shade val="50000"/>
-            </a:schemeClr>
-          </a:lnRef>
-          <a:fillRef idx="1">
-            <a:schemeClr val="accent3"/>
-          </a:fillRef>
-          <a:effectRef idx="0">
-            <a:schemeClr val="accent3"/>
-          </a:effectRef>
-          <a:fontRef idx="minor">
-            <a:schemeClr val="lt1"/>
-          </a:fontRef>
-        </p:style>
-        <p:txBody>
-          <a:bodyPr rtlCol="0" anchor="ctr"/>
-          <a:lstStyle/>
-          <a:p>
-            <a:pPr algn="ctr"/>
-            <a:r>
-              <a:rPr lang="en-GB" sz="1600" dirty="0" smtClean="0"/>
-              <a:t>Q2 </a:t>
-            </a:r>
-            <a:r>
-              <a:rPr lang="en-GB" sz="1600" dirty="0" err="1" smtClean="0"/>
-              <a:t>LeaseTerm</a:t>
-            </a:r>
-            <a:r>
-              <a:rPr lang="en-GB" sz="1600" dirty="0"/>
-              <a:t/>
-            </a:r>
-            <a:br>
-              <a:rPr lang="en-GB" sz="1600" dirty="0"/>
-            </a:br>
-            <a:r>
-              <a:rPr lang="en-GB" sz="1600" dirty="0" err="1"/>
-              <a:t>ForIndexableRent</a:t>
-            </a:r>
-            <a:endParaRPr lang="en-GB" sz="1600" dirty="0"/>
-          </a:p>
-        </p:txBody>
-      </p:sp>
-      <p:sp>
-        <p:nvSpPr>
-          <p:cNvPr id="31" name="Rectangle 30"/>
-          <p:cNvSpPr/>
-          <p:nvPr/>
-        </p:nvSpPr>
-        <p:spPr>
-          <a:xfrm>
-            <a:off x="2699792" y="2348880"/>
-            <a:ext cx="1728192" cy="600634"/>
-          </a:xfrm>
-          <a:prstGeom prst="rect">
-            <a:avLst/>
-          </a:prstGeom>
-          <a:ln/>
-        </p:spPr>
-        <p:style>
-          <a:lnRef idx="2">
-            <a:schemeClr val="accent4">
-              <a:shade val="50000"/>
-            </a:schemeClr>
-          </a:lnRef>
-          <a:fillRef idx="1">
-            <a:schemeClr val="accent4"/>
-          </a:fillRef>
-          <a:effectRef idx="0">
-            <a:schemeClr val="accent4"/>
-          </a:effectRef>
-          <a:fontRef idx="minor">
-            <a:schemeClr val="lt1"/>
-          </a:fontRef>
-        </p:style>
-        <p:txBody>
-          <a:bodyPr rtlCol="0" anchor="ctr"/>
-          <a:lstStyle/>
-          <a:p>
-            <a:pPr algn="ctr"/>
-            <a:r>
-              <a:rPr lang="en-GB" sz="1600" dirty="0" smtClean="0"/>
-              <a:t>Q3 </a:t>
-            </a:r>
-            <a:r>
-              <a:rPr lang="en-GB" sz="1600" dirty="0" err="1" smtClean="0"/>
-              <a:t>LeaseTerm</a:t>
-            </a:r>
-            <a:r>
-              <a:rPr lang="en-GB" sz="1600" dirty="0"/>
-              <a:t/>
-            </a:r>
-            <a:br>
-              <a:rPr lang="en-GB" sz="1600" dirty="0"/>
-            </a:br>
-            <a:r>
-              <a:rPr lang="en-GB" sz="1600" dirty="0" err="1" smtClean="0"/>
-              <a:t>ForServiceCharge</a:t>
-            </a:r>
-            <a:endParaRPr lang="en-GB" sz="1600" dirty="0"/>
-          </a:p>
-        </p:txBody>
-      </p:sp>
-      <p:sp>
-        <p:nvSpPr>
-          <p:cNvPr id="32" name="Rectangle 31"/>
-          <p:cNvSpPr/>
-          <p:nvPr/>
-        </p:nvSpPr>
-        <p:spPr>
-          <a:xfrm>
-            <a:off x="4860032" y="1628800"/>
-            <a:ext cx="1728192" cy="600634"/>
-          </a:xfrm>
-          <a:prstGeom prst="rect">
-            <a:avLst/>
-          </a:prstGeom>
-          <a:ln/>
-        </p:spPr>
-        <p:style>
-          <a:lnRef idx="2">
-            <a:schemeClr val="accent3">
-              <a:shade val="50000"/>
-            </a:schemeClr>
-          </a:lnRef>
-          <a:fillRef idx="1">
-            <a:schemeClr val="accent3"/>
-          </a:fillRef>
-          <a:effectRef idx="0">
-            <a:schemeClr val="accent3"/>
-          </a:effectRef>
-          <a:fontRef idx="minor">
-            <a:schemeClr val="lt1"/>
-          </a:fontRef>
-        </p:style>
-        <p:txBody>
-          <a:bodyPr rtlCol="0" anchor="ctr"/>
-          <a:lstStyle/>
-          <a:p>
-            <a:pPr algn="ctr"/>
-            <a:r>
-              <a:rPr lang="en-GB" sz="1600" dirty="0" smtClean="0"/>
-              <a:t>Q2 </a:t>
-            </a:r>
-            <a:r>
-              <a:rPr lang="en-GB" sz="1600" dirty="0" err="1" smtClean="0"/>
-              <a:t>LeaseTerm</a:t>
-            </a:r>
-            <a:r>
-              <a:rPr lang="en-GB" sz="1600" dirty="0"/>
-              <a:t/>
-            </a:r>
-            <a:br>
-              <a:rPr lang="en-GB" sz="1600" dirty="0"/>
-            </a:br>
-            <a:r>
-              <a:rPr lang="en-GB" sz="1600" dirty="0" err="1"/>
-              <a:t>ForIndexableRent</a:t>
-            </a:r>
-            <a:endParaRPr lang="en-GB" sz="1600" dirty="0"/>
-          </a:p>
-        </p:txBody>
-      </p:sp>
-      <p:sp>
-        <p:nvSpPr>
-          <p:cNvPr id="33" name="Rectangle 32"/>
-          <p:cNvSpPr/>
-          <p:nvPr/>
-        </p:nvSpPr>
-        <p:spPr>
-          <a:xfrm>
-            <a:off x="4860032" y="2348880"/>
-            <a:ext cx="1728192" cy="600634"/>
-          </a:xfrm>
-          <a:prstGeom prst="rect">
-            <a:avLst/>
-          </a:prstGeom>
-          <a:ln/>
-        </p:spPr>
-        <p:style>
-          <a:lnRef idx="2">
-            <a:schemeClr val="accent4">
-              <a:shade val="50000"/>
-            </a:schemeClr>
-          </a:lnRef>
-          <a:fillRef idx="1">
-            <a:schemeClr val="accent4"/>
-          </a:fillRef>
-          <a:effectRef idx="0">
-            <a:schemeClr val="accent4"/>
-          </a:effectRef>
-          <a:fontRef idx="minor">
-            <a:schemeClr val="lt1"/>
-          </a:fontRef>
-        </p:style>
-        <p:txBody>
-          <a:bodyPr rtlCol="0" anchor="ctr"/>
-          <a:lstStyle/>
-          <a:p>
-            <a:pPr algn="ctr"/>
-            <a:r>
-              <a:rPr lang="en-GB" sz="1600" dirty="0" smtClean="0"/>
-              <a:t>Q3 </a:t>
-            </a:r>
-            <a:r>
               <a:rPr lang="en-GB" sz="1600" dirty="0" err="1" smtClean="0"/>
               <a:t>LeaseTerm</a:t>
             </a:r>
@@ -4030,8 +3782,8 @@
         </p:nvCxnSpPr>
         <p:spPr>
           <a:xfrm flipV="1">
-            <a:off x="4716016" y="1691516"/>
-            <a:ext cx="0" cy="4185756"/>
+            <a:off x="4716016" y="3140968"/>
+            <a:ext cx="0" cy="2736304"/>
           </a:xfrm>
           <a:prstGeom prst="line">
             <a:avLst/>
@@ -4529,168 +4281,6 @@
           <a:chExt cx="0" cy="0"/>
         </a:xfrm>
       </p:grpSpPr>
-      <p:sp>
-        <p:nvSpPr>
-          <p:cNvPr id="4" name="Rectangle 3"/>
-          <p:cNvSpPr/>
-          <p:nvPr/>
-        </p:nvSpPr>
-        <p:spPr>
-          <a:xfrm>
-            <a:off x="2555776" y="116632"/>
-            <a:ext cx="1728192" cy="600634"/>
-          </a:xfrm>
-          <a:prstGeom prst="rect">
-            <a:avLst/>
-          </a:prstGeom>
-        </p:spPr>
-        <p:style>
-          <a:lnRef idx="2">
-            <a:schemeClr val="accent1">
-              <a:shade val="50000"/>
-            </a:schemeClr>
-          </a:lnRef>
-          <a:fillRef idx="1">
-            <a:schemeClr val="accent1"/>
-          </a:fillRef>
-          <a:effectRef idx="0">
-            <a:schemeClr val="accent1"/>
-          </a:effectRef>
-          <a:fontRef idx="minor">
-            <a:schemeClr val="lt1"/>
-          </a:fontRef>
-        </p:style>
-        <p:txBody>
-          <a:bodyPr rtlCol="0" anchor="ctr"/>
-          <a:lstStyle/>
-          <a:p>
-            <a:pPr algn="ctr"/>
-            <a:r>
-              <a:rPr lang="en-GB" sz="1600" dirty="0" smtClean="0"/>
-              <a:t>Lease</a:t>
-            </a:r>
-            <a:endParaRPr lang="en-GB" sz="1600" dirty="0"/>
-          </a:p>
-        </p:txBody>
-      </p:sp>
-      <p:sp>
-        <p:nvSpPr>
-          <p:cNvPr id="5" name="Rectangle 4"/>
-          <p:cNvSpPr/>
-          <p:nvPr/>
-        </p:nvSpPr>
-        <p:spPr>
-          <a:xfrm>
-            <a:off x="1115616" y="836712"/>
-            <a:ext cx="1728192" cy="600634"/>
-          </a:xfrm>
-          <a:prstGeom prst="rect">
-            <a:avLst/>
-          </a:prstGeom>
-          <a:ln/>
-        </p:spPr>
-        <p:style>
-          <a:lnRef idx="2">
-            <a:schemeClr val="accent3">
-              <a:shade val="50000"/>
-            </a:schemeClr>
-          </a:lnRef>
-          <a:fillRef idx="1">
-            <a:schemeClr val="accent3"/>
-          </a:fillRef>
-          <a:effectRef idx="0">
-            <a:schemeClr val="accent3"/>
-          </a:effectRef>
-          <a:fontRef idx="minor">
-            <a:schemeClr val="lt1"/>
-          </a:fontRef>
-        </p:style>
-        <p:txBody>
-          <a:bodyPr rtlCol="0" anchor="ctr"/>
-          <a:lstStyle/>
-          <a:p>
-            <a:pPr algn="ctr"/>
-            <a:r>
-              <a:rPr lang="en-GB" sz="1600" dirty="0" err="1" smtClean="0"/>
-              <a:t>LeaseItem</a:t>
-            </a:r>
-            <a:r>
-              <a:rPr lang="en-GB" sz="1600" dirty="0" smtClean="0"/>
-              <a:t/>
-            </a:r>
-            <a:br>
-              <a:rPr lang="en-GB" sz="1600" dirty="0" smtClean="0"/>
-            </a:br>
-            <a:r>
-              <a:rPr lang="en-GB" sz="1600" dirty="0" smtClean="0"/>
-              <a:t>(</a:t>
-            </a:r>
-            <a:r>
-              <a:rPr lang="en-GB" sz="1600" dirty="0" err="1" smtClean="0"/>
-              <a:t>indexable</a:t>
-            </a:r>
-            <a:r>
-              <a:rPr lang="en-GB" sz="1600" dirty="0" smtClean="0"/>
-              <a:t> rent)</a:t>
-            </a:r>
-            <a:endParaRPr lang="en-GB" sz="1600" dirty="0"/>
-          </a:p>
-        </p:txBody>
-      </p:sp>
-      <p:sp>
-        <p:nvSpPr>
-          <p:cNvPr id="7" name="Rectangle 6"/>
-          <p:cNvSpPr/>
-          <p:nvPr/>
-        </p:nvSpPr>
-        <p:spPr>
-          <a:xfrm>
-            <a:off x="4067944" y="836712"/>
-            <a:ext cx="1728192" cy="600634"/>
-          </a:xfrm>
-          <a:prstGeom prst="rect">
-            <a:avLst/>
-          </a:prstGeom>
-        </p:spPr>
-        <p:style>
-          <a:lnRef idx="2">
-            <a:schemeClr val="accent4">
-              <a:shade val="50000"/>
-            </a:schemeClr>
-          </a:lnRef>
-          <a:fillRef idx="1">
-            <a:schemeClr val="accent4"/>
-          </a:fillRef>
-          <a:effectRef idx="0">
-            <a:schemeClr val="accent4"/>
-          </a:effectRef>
-          <a:fontRef idx="minor">
-            <a:schemeClr val="lt1"/>
-          </a:fontRef>
-        </p:style>
-        <p:txBody>
-          <a:bodyPr rtlCol="0" anchor="ctr"/>
-          <a:lstStyle/>
-          <a:p>
-            <a:pPr algn="ctr"/>
-            <a:r>
-              <a:rPr lang="en-GB" sz="1600" dirty="0" err="1"/>
-              <a:t>LeaseItem</a:t>
-            </a:r>
-            <a:r>
-              <a:rPr lang="en-GB" sz="1600" dirty="0"/>
-              <a:t/>
-            </a:r>
-            <a:br>
-              <a:rPr lang="en-GB" sz="1600" dirty="0"/>
-            </a:br>
-            <a:r>
-              <a:rPr lang="en-GB" sz="1600" dirty="0"/>
-              <a:t>(service charge)</a:t>
-            </a:r>
-          </a:p>
-        </p:txBody>
-      </p:sp>
       <p:cxnSp>
         <p:nvCxnSpPr>
           <p:cNvPr id="9" name="Straight Connector 8"/>
@@ -4846,15 +4436,46 @@
           </a:fontRef>
         </p:style>
       </p:cxnSp>
-      <p:sp>
-        <p:nvSpPr>
-          <p:cNvPr id="15" name="Rectangle 14"/>
+      <p:cxnSp>
+        <p:nvCxnSpPr>
+          <p:cNvPr id="16" name="Straight Connector 15"/>
+          <p:cNvCxnSpPr/>
+          <p:nvPr/>
+        </p:nvCxnSpPr>
+        <p:spPr>
+          <a:xfrm flipV="1">
+            <a:off x="8748464" y="3366284"/>
+            <a:ext cx="0" cy="296416"/>
+          </a:xfrm>
+          <a:prstGeom prst="line">
+            <a:avLst/>
+          </a:prstGeom>
+          <a:ln w="19050"/>
+        </p:spPr>
+        <p:style>
+          <a:lnRef idx="1">
+            <a:schemeClr val="accent1"/>
+          </a:lnRef>
+          <a:fillRef idx="0">
+            <a:schemeClr val="accent1"/>
+          </a:fillRef>
+          <a:effectRef idx="0">
+            <a:schemeClr val="accent1"/>
+          </a:effectRef>
+          <a:fontRef idx="minor">
+            <a:schemeClr val="tx1"/>
+          </a:fontRef>
+        </p:style>
+      </p:cxnSp>
+      <p:sp>
+        <p:nvSpPr>
+          <p:cNvPr id="18" name="Rectangle 17"/>
           <p:cNvSpPr/>
           <p:nvPr/>
         </p:nvSpPr>
         <p:spPr>
           <a:xfrm>
-            <a:off x="323528" y="1628800"/>
+            <a:off x="323528" y="3861048"/>
             <a:ext cx="1728192" cy="600634"/>
           </a:xfrm>
           <a:prstGeom prst="rect">
@@ -4884,68 +4505,217 @@
           <a:p>
             <a:pPr algn="ctr"/>
             <a:r>
+              <a:rPr lang="en-GB" sz="1600" dirty="0" err="1" smtClean="0"/>
+              <a:t>InvoiceItem</a:t>
+            </a:r>
+            <a:r>
               <a:rPr lang="en-GB" sz="1600" dirty="0" smtClean="0"/>
-              <a:t>Q1 </a:t>
-            </a:r>
-            <a:r>
-              <a:rPr lang="en-GB" sz="1600" dirty="0" err="1" smtClean="0"/>
-              <a:t>LeaseTerm</a:t>
-            </a:r>
-            <a:r>
-              <a:rPr lang="en-GB" sz="1600" dirty="0"/>
               <a:t/>
             </a:r>
             <a:br>
-              <a:rPr lang="en-GB" sz="1600" dirty="0"/>
+              <a:rPr lang="en-GB" sz="1600" dirty="0" smtClean="0"/>
             </a:br>
             <a:r>
-              <a:rPr lang="en-GB" sz="1600" dirty="0" err="1"/>
-              <a:t>ForIndexableRent</a:t>
+              <a:rPr lang="en-GB" sz="1400" dirty="0" smtClean="0"/>
+              <a:t>for Q1 </a:t>
+            </a:r>
+            <a:r>
+              <a:rPr lang="en-GB" sz="1400" dirty="0" err="1" smtClean="0"/>
+              <a:t>IndexableRent</a:t>
             </a:r>
             <a:endParaRPr lang="en-GB" sz="1600" dirty="0"/>
           </a:p>
         </p:txBody>
       </p:sp>
-      <p:cxnSp>
-        <p:nvCxnSpPr>
-          <p:cNvPr id="16" name="Straight Connector 15"/>
-          <p:cNvCxnSpPr/>
+      <p:sp>
+        <p:nvSpPr>
+          <p:cNvPr id="19" name="TextBox 18"/>
+          <p:cNvSpPr txBox="1"/>
           <p:nvPr/>
-        </p:nvCxnSpPr>
-        <p:spPr>
-          <a:xfrm flipV="1">
-            <a:off x="8748464" y="3366284"/>
-            <a:ext cx="0" cy="296416"/>
-          </a:xfrm>
-          <a:prstGeom prst="line">
-            <a:avLst/>
-          </a:prstGeom>
-          <a:ln w="19050"/>
+        </p:nvSpPr>
+        <p:spPr>
+          <a:xfrm>
+            <a:off x="395536" y="3140968"/>
+            <a:ext cx="457176" cy="369332"/>
+          </a:xfrm>
+          <a:prstGeom prst="rect">
+            <a:avLst/>
+          </a:prstGeom>
+          <a:noFill/>
+        </p:spPr>
+        <p:txBody>
+          <a:bodyPr wrap="none" rtlCol="0">
+            <a:spAutoFit/>
+          </a:bodyPr>
+          <a:lstStyle/>
+          <a:p>
+            <a:r>
+              <a:rPr lang="en-GB" dirty="0" smtClean="0"/>
+              <a:t>Q1</a:t>
+            </a:r>
+            <a:endParaRPr lang="en-GB" dirty="0"/>
+          </a:p>
+        </p:txBody>
+      </p:sp>
+      <p:sp>
+        <p:nvSpPr>
+          <p:cNvPr id="20" name="TextBox 19"/>
+          <p:cNvSpPr txBox="1"/>
+          <p:nvPr/>
+        </p:nvSpPr>
+        <p:spPr>
+          <a:xfrm>
+            <a:off x="2386632" y="3140968"/>
+            <a:ext cx="457176" cy="369332"/>
+          </a:xfrm>
+          <a:prstGeom prst="rect">
+            <a:avLst/>
+          </a:prstGeom>
+          <a:noFill/>
+        </p:spPr>
+        <p:txBody>
+          <a:bodyPr wrap="none" rtlCol="0">
+            <a:spAutoFit/>
+          </a:bodyPr>
+          <a:lstStyle/>
+          <a:p>
+            <a:r>
+              <a:rPr lang="en-GB" smtClean="0"/>
+              <a:t>Q2</a:t>
+            </a:r>
+            <a:endParaRPr lang="en-GB" dirty="0"/>
+          </a:p>
+        </p:txBody>
+      </p:sp>
+      <p:sp>
+        <p:nvSpPr>
+          <p:cNvPr id="21" name="TextBox 20"/>
+          <p:cNvSpPr txBox="1"/>
+          <p:nvPr/>
+        </p:nvSpPr>
+        <p:spPr>
+          <a:xfrm>
+            <a:off x="4644008" y="3140968"/>
+            <a:ext cx="457176" cy="369332"/>
+          </a:xfrm>
+          <a:prstGeom prst="rect">
+            <a:avLst/>
+          </a:prstGeom>
+          <a:noFill/>
+        </p:spPr>
+        <p:txBody>
+          <a:bodyPr wrap="none" rtlCol="0">
+            <a:spAutoFit/>
+          </a:bodyPr>
+          <a:lstStyle/>
+          <a:p>
+            <a:r>
+              <a:rPr lang="en-GB" dirty="0" smtClean="0"/>
+              <a:t>Q3</a:t>
+            </a:r>
+            <a:endParaRPr lang="en-GB" dirty="0"/>
+          </a:p>
+        </p:txBody>
+      </p:sp>
+      <p:sp>
+        <p:nvSpPr>
+          <p:cNvPr id="22" name="TextBox 21"/>
+          <p:cNvSpPr txBox="1"/>
+          <p:nvPr/>
+        </p:nvSpPr>
+        <p:spPr>
+          <a:xfrm>
+            <a:off x="6851128" y="3140968"/>
+            <a:ext cx="457176" cy="369332"/>
+          </a:xfrm>
+          <a:prstGeom prst="rect">
+            <a:avLst/>
+          </a:prstGeom>
+          <a:noFill/>
+        </p:spPr>
+        <p:txBody>
+          <a:bodyPr wrap="none" rtlCol="0">
+            <a:spAutoFit/>
+          </a:bodyPr>
+          <a:lstStyle/>
+          <a:p>
+            <a:r>
+              <a:rPr lang="en-GB" dirty="0" smtClean="0"/>
+              <a:t>Q4</a:t>
+            </a:r>
+            <a:endParaRPr lang="en-GB" dirty="0"/>
+          </a:p>
+        </p:txBody>
+      </p:sp>
+      <p:sp>
+        <p:nvSpPr>
+          <p:cNvPr id="34" name="Rectangle 33"/>
+          <p:cNvSpPr/>
+          <p:nvPr/>
+        </p:nvSpPr>
+        <p:spPr>
+          <a:xfrm>
+            <a:off x="323528" y="4797152"/>
+            <a:ext cx="1728192" cy="600634"/>
+          </a:xfrm>
+          <a:prstGeom prst="rect">
+            <a:avLst/>
+          </a:prstGeom>
+          <a:ln/>
         </p:spPr>
         <p:style>
-          <a:lnRef idx="1">
-            <a:schemeClr val="accent1"/>
+          <a:lnRef idx="2">
+            <a:schemeClr val="accent4">
+              <a:shade val="50000"/>
+            </a:schemeClr>
           </a:lnRef>
-          <a:fillRef idx="0">
-            <a:schemeClr val="accent1"/>
+          <a:fillRef idx="1">
+            <a:schemeClr val="accent4"/>
           </a:fillRef>
           <a:effectRef idx="0">
-            <a:schemeClr val="accent1"/>
+            <a:schemeClr val="accent4"/>
           </a:effectRef>
           <a:fontRef idx="minor">
-            <a:schemeClr val="tx1"/>
+            <a:schemeClr val="lt1"/>
           </a:fontRef>
         </p:style>
-      </p:cxnSp>
-      <p:sp>
-        <p:nvSpPr>
-          <p:cNvPr id="18" name="Rectangle 17"/>
+        <p:txBody>
+          <a:bodyPr rtlCol="0" anchor="ctr"/>
+          <a:lstStyle/>
+          <a:p>
+            <a:pPr algn="ctr"/>
+            <a:r>
+              <a:rPr lang="en-GB" sz="1600" dirty="0" err="1" smtClean="0"/>
+              <a:t>InvoiceItem</a:t>
+            </a:r>
+            <a:r>
+              <a:rPr lang="en-GB" sz="1600" dirty="0" smtClean="0"/>
+              <a:t/>
+            </a:r>
+            <a:br>
+              <a:rPr lang="en-GB" sz="1600" dirty="0" smtClean="0"/>
+            </a:br>
+            <a:r>
+              <a:rPr lang="en-GB" sz="1400" dirty="0" smtClean="0"/>
+              <a:t>for Q1 </a:t>
+            </a:r>
+            <a:r>
+              <a:rPr lang="en-GB" sz="1400" dirty="0" err="1" smtClean="0"/>
+              <a:t>ServiceCharge</a:t>
+            </a:r>
+            <a:endParaRPr lang="en-GB" sz="1600" dirty="0"/>
+          </a:p>
+        </p:txBody>
+      </p:sp>
+      <p:sp>
+        <p:nvSpPr>
+          <p:cNvPr id="35" name="Rectangle 34"/>
           <p:cNvSpPr/>
           <p:nvPr/>
         </p:nvSpPr>
         <p:spPr>
           <a:xfrm>
-            <a:off x="323528" y="3861048"/>
+            <a:off x="2699792" y="3861048"/>
             <a:ext cx="1728192" cy="600634"/>
           </a:xfrm>
           <a:prstGeom prst="rect">
@@ -4987,7 +4757,7 @@
             </a:br>
             <a:r>
               <a:rPr lang="en-GB" sz="1400" dirty="0" smtClean="0"/>
-              <a:t>for Q1 </a:t>
+              <a:t>for Q2 </a:t>
             </a:r>
             <a:r>
               <a:rPr lang="en-GB" sz="1400" dirty="0" err="1" smtClean="0"/>
@@ -4999,133 +4769,13 @@
       </p:sp>
       <p:sp>
         <p:nvSpPr>
-          <p:cNvPr id="19" name="TextBox 18"/>
-          <p:cNvSpPr txBox="1"/>
-          <p:nvPr/>
-        </p:nvSpPr>
-        <p:spPr>
-          <a:xfrm>
-            <a:off x="395536" y="3140968"/>
-            <a:ext cx="457176" cy="369332"/>
-          </a:xfrm>
-          <a:prstGeom prst="rect">
-            <a:avLst/>
-          </a:prstGeom>
-          <a:noFill/>
-        </p:spPr>
-        <p:txBody>
-          <a:bodyPr wrap="none" rtlCol="0">
-            <a:spAutoFit/>
-          </a:bodyPr>
-          <a:lstStyle/>
-          <a:p>
-            <a:r>
-              <a:rPr lang="en-GB" dirty="0" smtClean="0"/>
-              <a:t>Q1</a:t>
-            </a:r>
-            <a:endParaRPr lang="en-GB" dirty="0"/>
-          </a:p>
-        </p:txBody>
-      </p:sp>
-      <p:sp>
-        <p:nvSpPr>
-          <p:cNvPr id="20" name="TextBox 19"/>
-          <p:cNvSpPr txBox="1"/>
-          <p:nvPr/>
-        </p:nvSpPr>
-        <p:spPr>
-          <a:xfrm>
-            <a:off x="2386632" y="3140968"/>
-            <a:ext cx="457176" cy="369332"/>
-          </a:xfrm>
-          <a:prstGeom prst="rect">
-            <a:avLst/>
-          </a:prstGeom>
-          <a:noFill/>
-        </p:spPr>
-        <p:txBody>
-          <a:bodyPr wrap="none" rtlCol="0">
-            <a:spAutoFit/>
-          </a:bodyPr>
-          <a:lstStyle/>
-          <a:p>
-            <a:r>
-              <a:rPr lang="en-GB" smtClean="0"/>
-              <a:t>Q2</a:t>
-            </a:r>
-            <a:endParaRPr lang="en-GB" dirty="0"/>
-          </a:p>
-        </p:txBody>
-      </p:sp>
-      <p:sp>
-        <p:nvSpPr>
-          <p:cNvPr id="21" name="TextBox 20"/>
-          <p:cNvSpPr txBox="1"/>
-          <p:nvPr/>
-        </p:nvSpPr>
-        <p:spPr>
-          <a:xfrm>
-            <a:off x="4644008" y="3140968"/>
-            <a:ext cx="457176" cy="369332"/>
-          </a:xfrm>
-          <a:prstGeom prst="rect">
-            <a:avLst/>
-          </a:prstGeom>
-          <a:noFill/>
-        </p:spPr>
-        <p:txBody>
-          <a:bodyPr wrap="none" rtlCol="0">
-            <a:spAutoFit/>
-          </a:bodyPr>
-          <a:lstStyle/>
-          <a:p>
-            <a:r>
-              <a:rPr lang="en-GB" dirty="0" smtClean="0"/>
-              <a:t>Q3</a:t>
-            </a:r>
-            <a:endParaRPr lang="en-GB" dirty="0"/>
-          </a:p>
-        </p:txBody>
-      </p:sp>
-      <p:sp>
-        <p:nvSpPr>
-          <p:cNvPr id="22" name="TextBox 21"/>
-          <p:cNvSpPr txBox="1"/>
-          <p:nvPr/>
-        </p:nvSpPr>
-        <p:spPr>
-          <a:xfrm>
-            <a:off x="6851128" y="3140968"/>
-            <a:ext cx="457176" cy="369332"/>
-          </a:xfrm>
-          <a:prstGeom prst="rect">
-            <a:avLst/>
-          </a:prstGeom>
-          <a:noFill/>
-        </p:spPr>
-        <p:txBody>
-          <a:bodyPr wrap="none" rtlCol="0">
-            <a:spAutoFit/>
-          </a:bodyPr>
-          <a:lstStyle/>
-          <a:p>
-            <a:r>
-              <a:rPr lang="en-GB" dirty="0" smtClean="0"/>
-              <a:t>Q4</a:t>
-            </a:r>
-            <a:endParaRPr lang="en-GB" dirty="0"/>
-          </a:p>
-        </p:txBody>
-      </p:sp>
-      <p:sp>
-        <p:nvSpPr>
-          <p:cNvPr id="29" name="Rectangle 28"/>
+          <p:cNvPr id="36" name="Rectangle 35"/>
           <p:cNvSpPr/>
           <p:nvPr/>
         </p:nvSpPr>
         <p:spPr>
           <a:xfrm>
-            <a:off x="323528" y="2348880"/>
+            <a:off x="2699792" y="4797152"/>
             <a:ext cx="1728192" cy="600634"/>
           </a:xfrm>
           <a:prstGeom prst="rect">
@@ -5155,23 +4805,23 @@
           <a:p>
             <a:pPr algn="ctr"/>
             <a:r>
+              <a:rPr lang="en-GB" sz="1600" dirty="0" err="1" smtClean="0"/>
+              <a:t>InvoiceItem</a:t>
+            </a:r>
+            <a:r>
               <a:rPr lang="en-GB" sz="1600" dirty="0" smtClean="0"/>
-              <a:t>Q1 </a:t>
-            </a:r>
-            <a:r>
-              <a:rPr lang="en-GB" sz="1600" dirty="0" err="1" smtClean="0"/>
-              <a:t>LeaseTerm</a:t>
-            </a:r>
-            <a:r>
-              <a:rPr lang="en-GB" sz="1600" dirty="0"/>
               <a:t/>
             </a:r>
             <a:br>
-              <a:rPr lang="en-GB" sz="1600" dirty="0"/>
+              <a:rPr lang="en-GB" sz="1600" dirty="0" smtClean="0"/>
             </a:br>
             <a:r>
-              <a:rPr lang="en-GB" sz="1600" dirty="0" err="1" smtClean="0"/>
-              <a:t>ForServiceCharge</a:t>
+              <a:rPr lang="en-GB" sz="1400" dirty="0" smtClean="0"/>
+              <a:t>for Q2 </a:t>
+            </a:r>
+            <a:r>
+              <a:rPr lang="en-GB" sz="1400" dirty="0" err="1" smtClean="0"/>
+              <a:t>ServiceCharge</a:t>
             </a:r>
             <a:endParaRPr lang="en-GB" sz="1600" dirty="0"/>
           </a:p>
@@ -5179,13 +4829,13 @@
       </p:sp>
       <p:sp>
         <p:nvSpPr>
-          <p:cNvPr id="30" name="Rectangle 29"/>
+          <p:cNvPr id="37" name="Rectangle 36"/>
           <p:cNvSpPr/>
           <p:nvPr/>
         </p:nvSpPr>
         <p:spPr>
           <a:xfrm>
-            <a:off x="2699792" y="1628800"/>
+            <a:off x="4860032" y="3861048"/>
             <a:ext cx="1728192" cy="600634"/>
           </a:xfrm>
           <a:prstGeom prst="rect">
@@ -5215,23 +4865,23 @@
           <a:p>
             <a:pPr algn="ctr"/>
             <a:r>
+              <a:rPr lang="en-GB" sz="1600" dirty="0" err="1" smtClean="0"/>
+              <a:t>InvoiceItem</a:t>
+            </a:r>
+            <a:r>
               <a:rPr lang="en-GB" sz="1600" dirty="0" smtClean="0"/>
-              <a:t>Q2 </a:t>
-            </a:r>
-            <a:r>
-              <a:rPr lang="en-GB" sz="1600" dirty="0" err="1" smtClean="0"/>
-              <a:t>LeaseTerm</a:t>
-            </a:r>
-            <a:r>
-              <a:rPr lang="en-GB" sz="1600" dirty="0"/>
               <a:t/>
             </a:r>
             <a:br>
-              <a:rPr lang="en-GB" sz="1600" dirty="0"/>
+              <a:rPr lang="en-GB" sz="1600" dirty="0" smtClean="0"/>
             </a:br>
             <a:r>
-              <a:rPr lang="en-GB" sz="1600" dirty="0" err="1"/>
-              <a:t>ForIndexableRent</a:t>
+              <a:rPr lang="en-GB" sz="1400" dirty="0" smtClean="0"/>
+              <a:t>for Q3 </a:t>
+            </a:r>
+            <a:r>
+              <a:rPr lang="en-GB" sz="1400" dirty="0" err="1" smtClean="0"/>
+              <a:t>IndexableRent</a:t>
             </a:r>
             <a:endParaRPr lang="en-GB" sz="1600" dirty="0"/>
           </a:p>
@@ -5239,13 +4889,13 @@
       </p:sp>
       <p:sp>
         <p:nvSpPr>
-          <p:cNvPr id="31" name="Rectangle 30"/>
+          <p:cNvPr id="38" name="Rectangle 37"/>
           <p:cNvSpPr/>
           <p:nvPr/>
         </p:nvSpPr>
         <p:spPr>
           <a:xfrm>
-            <a:off x="2699792" y="2348880"/>
+            <a:off x="4860032" y="4797152"/>
             <a:ext cx="1728192" cy="600634"/>
           </a:xfrm>
           <a:prstGeom prst="rect">
@@ -5275,23 +4925,23 @@
           <a:p>
             <a:pPr algn="ctr"/>
             <a:r>
+              <a:rPr lang="en-GB" sz="1600" dirty="0" err="1" smtClean="0"/>
+              <a:t>InvoiceItem</a:t>
+            </a:r>
+            <a:r>
               <a:rPr lang="en-GB" sz="1600" dirty="0" smtClean="0"/>
-              <a:t>Q3 </a:t>
-            </a:r>
-            <a:r>
-              <a:rPr lang="en-GB" sz="1600" dirty="0" err="1" smtClean="0"/>
-              <a:t>LeaseTerm</a:t>
-            </a:r>
-            <a:r>
-              <a:rPr lang="en-GB" sz="1600" dirty="0"/>
               <a:t/>
             </a:r>
             <a:br>
-              <a:rPr lang="en-GB" sz="1600" dirty="0"/>
+              <a:rPr lang="en-GB" sz="1600" dirty="0" smtClean="0"/>
             </a:br>
             <a:r>
-              <a:rPr lang="en-GB" sz="1600" dirty="0" err="1" smtClean="0"/>
-              <a:t>ForServiceCharge</a:t>
+              <a:rPr lang="en-GB" sz="1400" dirty="0" smtClean="0"/>
+              <a:t>for Q3 </a:t>
+            </a:r>
+            <a:r>
+              <a:rPr lang="en-GB" sz="1400" dirty="0" err="1" smtClean="0"/>
+              <a:t>ServiceCharge</a:t>
             </a:r>
             <a:endParaRPr lang="en-GB" sz="1600" dirty="0"/>
           </a:p>
@@ -5299,13 +4949,417 @@
       </p:sp>
       <p:sp>
         <p:nvSpPr>
-          <p:cNvPr id="32" name="Rectangle 31"/>
+          <p:cNvPr id="39" name="Rectangle 38"/>
           <p:cNvSpPr/>
           <p:nvPr/>
         </p:nvSpPr>
         <p:spPr>
           <a:xfrm>
-            <a:off x="4860032" y="1628800"/>
+            <a:off x="467544" y="4424125"/>
+            <a:ext cx="1728192" cy="469605"/>
+          </a:xfrm>
+          <a:prstGeom prst="rect">
+            <a:avLst/>
+          </a:prstGeom>
+          <a:ln/>
+        </p:spPr>
+        <p:style>
+          <a:lnRef idx="2">
+            <a:schemeClr val="accent5">
+              <a:shade val="50000"/>
+            </a:schemeClr>
+          </a:lnRef>
+          <a:fillRef idx="1">
+            <a:schemeClr val="accent5"/>
+          </a:fillRef>
+          <a:effectRef idx="0">
+            <a:schemeClr val="accent5"/>
+          </a:effectRef>
+          <a:fontRef idx="minor">
+            <a:schemeClr val="lt1"/>
+          </a:fontRef>
+        </p:style>
+        <p:txBody>
+          <a:bodyPr rtlCol="0" anchor="ctr"/>
+          <a:lstStyle/>
+          <a:p>
+            <a:pPr algn="ctr"/>
+            <a:r>
+              <a:rPr lang="en-GB" sz="1600" dirty="0" smtClean="0"/>
+              <a:t>Invoice for Q1</a:t>
+            </a:r>
+            <a:br>
+              <a:rPr lang="en-GB" sz="1600" dirty="0" smtClean="0"/>
+            </a:br>
+            <a:r>
+              <a:rPr lang="en-GB" sz="1200" dirty="0" smtClean="0"/>
+              <a:t>(approved)</a:t>
+            </a:r>
+            <a:endParaRPr lang="en-GB" sz="1600" dirty="0"/>
+          </a:p>
+        </p:txBody>
+      </p:sp>
+      <p:sp>
+        <p:nvSpPr>
+          <p:cNvPr id="40" name="Rectangle 39"/>
+          <p:cNvSpPr/>
+          <p:nvPr/>
+        </p:nvSpPr>
+        <p:spPr>
+          <a:xfrm>
+            <a:off x="2843808" y="4425193"/>
+            <a:ext cx="1728192" cy="469605"/>
+          </a:xfrm>
+          <a:prstGeom prst="rect">
+            <a:avLst/>
+          </a:prstGeom>
+          <a:ln/>
+        </p:spPr>
+        <p:style>
+          <a:lnRef idx="2">
+            <a:schemeClr val="accent5">
+              <a:shade val="50000"/>
+            </a:schemeClr>
+          </a:lnRef>
+          <a:fillRef idx="1">
+            <a:schemeClr val="accent5"/>
+          </a:fillRef>
+          <a:effectRef idx="0">
+            <a:schemeClr val="accent5"/>
+          </a:effectRef>
+          <a:fontRef idx="minor">
+            <a:schemeClr val="lt1"/>
+          </a:fontRef>
+        </p:style>
+        <p:txBody>
+          <a:bodyPr rtlCol="0" anchor="ctr"/>
+          <a:lstStyle/>
+          <a:p>
+            <a:pPr algn="ctr"/>
+            <a:r>
+              <a:rPr lang="en-GB" sz="1600" dirty="0" smtClean="0"/>
+              <a:t>Invoice for Q2</a:t>
+            </a:r>
+            <a:br>
+              <a:rPr lang="en-GB" sz="1600" dirty="0" smtClean="0"/>
+            </a:br>
+            <a:r>
+              <a:rPr lang="en-GB" sz="1200" dirty="0" smtClean="0"/>
+              <a:t>(approved)</a:t>
+            </a:r>
+            <a:endParaRPr lang="en-GB" sz="1600" dirty="0"/>
+          </a:p>
+        </p:txBody>
+      </p:sp>
+      <p:sp>
+        <p:nvSpPr>
+          <p:cNvPr id="41" name="Rectangle 40"/>
+          <p:cNvSpPr/>
+          <p:nvPr/>
+        </p:nvSpPr>
+        <p:spPr>
+          <a:xfrm>
+            <a:off x="5004048" y="4416647"/>
+            <a:ext cx="1728192" cy="469605"/>
+          </a:xfrm>
+          <a:prstGeom prst="rect">
+            <a:avLst/>
+          </a:prstGeom>
+          <a:ln/>
+        </p:spPr>
+        <p:style>
+          <a:lnRef idx="2">
+            <a:schemeClr val="accent5">
+              <a:shade val="50000"/>
+            </a:schemeClr>
+          </a:lnRef>
+          <a:fillRef idx="1">
+            <a:schemeClr val="accent5"/>
+          </a:fillRef>
+          <a:effectRef idx="0">
+            <a:schemeClr val="accent5"/>
+          </a:effectRef>
+          <a:fontRef idx="minor">
+            <a:schemeClr val="lt1"/>
+          </a:fontRef>
+        </p:style>
+        <p:txBody>
+          <a:bodyPr rtlCol="0" anchor="ctr"/>
+          <a:lstStyle/>
+          <a:p>
+            <a:pPr algn="ctr"/>
+            <a:r>
+              <a:rPr lang="en-GB" sz="1600" dirty="0" smtClean="0"/>
+              <a:t>Invoice for Q3</a:t>
+            </a:r>
+            <a:br>
+              <a:rPr lang="en-GB" sz="1600" dirty="0" smtClean="0"/>
+            </a:br>
+            <a:r>
+              <a:rPr lang="en-GB" sz="1200" dirty="0" smtClean="0"/>
+              <a:t>(new)</a:t>
+            </a:r>
+            <a:endParaRPr lang="en-GB" sz="1600" dirty="0"/>
+          </a:p>
+        </p:txBody>
+      </p:sp>
+      <p:sp>
+        <p:nvSpPr>
+          <p:cNvPr id="42" name="Rectangle 41"/>
+          <p:cNvSpPr/>
+          <p:nvPr/>
+        </p:nvSpPr>
+        <p:spPr>
+          <a:xfrm>
+            <a:off x="2699792" y="5996718"/>
+            <a:ext cx="1728192" cy="600634"/>
+          </a:xfrm>
+          <a:prstGeom prst="rect">
+            <a:avLst/>
+          </a:prstGeom>
+          <a:ln/>
+        </p:spPr>
+        <p:style>
+          <a:lnRef idx="2">
+            <a:schemeClr val="accent4">
+              <a:shade val="50000"/>
+            </a:schemeClr>
+          </a:lnRef>
+          <a:fillRef idx="1">
+            <a:schemeClr val="accent4"/>
+          </a:fillRef>
+          <a:effectRef idx="0">
+            <a:schemeClr val="accent4"/>
+          </a:effectRef>
+          <a:fontRef idx="minor">
+            <a:schemeClr val="lt1"/>
+          </a:fontRef>
+        </p:style>
+        <p:txBody>
+          <a:bodyPr rtlCol="0" anchor="ctr"/>
+          <a:lstStyle/>
+          <a:p>
+            <a:pPr algn="ctr"/>
+            <a:r>
+              <a:rPr lang="en-GB" sz="1600" dirty="0" err="1" smtClean="0"/>
+              <a:t>InvoiceItem</a:t>
+            </a:r>
+            <a:r>
+              <a:rPr lang="en-GB" sz="1600" dirty="0" smtClean="0"/>
+              <a:t/>
+            </a:r>
+            <a:br>
+              <a:rPr lang="en-GB" sz="1600" dirty="0" smtClean="0"/>
+            </a:br>
+            <a:r>
+              <a:rPr lang="en-GB" sz="1400" dirty="0" smtClean="0"/>
+              <a:t>for Q2 </a:t>
+            </a:r>
+            <a:r>
+              <a:rPr lang="en-GB" sz="1400" dirty="0" err="1" smtClean="0"/>
+              <a:t>ServiceCharge</a:t>
+            </a:r>
+            <a:endParaRPr lang="en-GB" sz="1600" dirty="0"/>
+          </a:p>
+        </p:txBody>
+      </p:sp>
+      <p:sp>
+        <p:nvSpPr>
+          <p:cNvPr id="43" name="Rectangle 42"/>
+          <p:cNvSpPr/>
+          <p:nvPr/>
+        </p:nvSpPr>
+        <p:spPr>
+          <a:xfrm>
+            <a:off x="2843808" y="5624759"/>
+            <a:ext cx="1728192" cy="469605"/>
+          </a:xfrm>
+          <a:prstGeom prst="rect">
+            <a:avLst/>
+          </a:prstGeom>
+          <a:ln/>
+        </p:spPr>
+        <p:style>
+          <a:lnRef idx="2">
+            <a:schemeClr val="accent5">
+              <a:shade val="50000"/>
+            </a:schemeClr>
+          </a:lnRef>
+          <a:fillRef idx="1">
+            <a:schemeClr val="accent5"/>
+          </a:fillRef>
+          <a:effectRef idx="0">
+            <a:schemeClr val="accent5"/>
+          </a:effectRef>
+          <a:fontRef idx="minor">
+            <a:schemeClr val="lt1"/>
+          </a:fontRef>
+        </p:style>
+        <p:txBody>
+          <a:bodyPr rtlCol="0" anchor="ctr"/>
+          <a:lstStyle/>
+          <a:p>
+            <a:pPr algn="ctr"/>
+            <a:r>
+              <a:rPr lang="en-GB" sz="1600" dirty="0" smtClean="0"/>
+              <a:t>Invoice for Q2</a:t>
+            </a:r>
+            <a:br>
+              <a:rPr lang="en-GB" sz="1600" dirty="0" smtClean="0"/>
+            </a:br>
+            <a:r>
+              <a:rPr lang="en-GB" sz="1200" dirty="0" smtClean="0"/>
+              <a:t>(new)</a:t>
+            </a:r>
+            <a:endParaRPr lang="en-GB" sz="1600" dirty="0"/>
+          </a:p>
+        </p:txBody>
+      </p:sp>
+      <p:sp>
+        <p:nvSpPr>
+          <p:cNvPr id="44" name="TextBox 43"/>
+          <p:cNvSpPr txBox="1"/>
+          <p:nvPr/>
+        </p:nvSpPr>
+        <p:spPr>
+          <a:xfrm>
+            <a:off x="4699545" y="6300028"/>
+            <a:ext cx="592535" cy="369332"/>
+          </a:xfrm>
+          <a:prstGeom prst="rect">
+            <a:avLst/>
+          </a:prstGeom>
+          <a:noFill/>
+        </p:spPr>
+        <p:txBody>
+          <a:bodyPr wrap="none" rtlCol="0">
+            <a:spAutoFit/>
+          </a:bodyPr>
+          <a:lstStyle/>
+          <a:p>
+            <a:r>
+              <a:rPr lang="en-GB" dirty="0" smtClean="0">
+                <a:solidFill>
+                  <a:srgbClr val="FF0000"/>
+                </a:solidFill>
+              </a:rPr>
+              <a:t>now</a:t>
+            </a:r>
+            <a:endParaRPr lang="en-GB" dirty="0">
+              <a:solidFill>
+                <a:srgbClr val="FF0000"/>
+              </a:solidFill>
+            </a:endParaRPr>
+          </a:p>
+        </p:txBody>
+      </p:sp>
+      <p:sp>
+        <p:nvSpPr>
+          <p:cNvPr id="46" name="TextBox 45"/>
+          <p:cNvSpPr txBox="1"/>
+          <p:nvPr/>
+        </p:nvSpPr>
+        <p:spPr>
+          <a:xfrm>
+            <a:off x="1412194" y="6011996"/>
+            <a:ext cx="1045543" cy="646331"/>
+          </a:xfrm>
+          <a:prstGeom prst="rect">
+            <a:avLst/>
+          </a:prstGeom>
+          <a:noFill/>
+        </p:spPr>
+        <p:txBody>
+          <a:bodyPr wrap="none" rtlCol="0">
+            <a:spAutoFit/>
+          </a:bodyPr>
+          <a:lstStyle/>
+          <a:p>
+            <a:pPr algn="r"/>
+            <a:r>
+              <a:rPr lang="en-GB" dirty="0" smtClean="0">
+                <a:solidFill>
+                  <a:srgbClr val="FFC000"/>
+                </a:solidFill>
+              </a:rPr>
+              <a:t>retro-run</a:t>
+            </a:r>
+            <a:br>
+              <a:rPr lang="en-GB" dirty="0" smtClean="0">
+                <a:solidFill>
+                  <a:srgbClr val="FFC000"/>
+                </a:solidFill>
+              </a:rPr>
+            </a:br>
+            <a:r>
+              <a:rPr lang="en-GB" dirty="0" smtClean="0">
+                <a:solidFill>
+                  <a:srgbClr val="FFC000"/>
+                </a:solidFill>
+              </a:rPr>
+              <a:t>from</a:t>
+            </a:r>
+            <a:endParaRPr lang="en-GB" dirty="0">
+              <a:solidFill>
+                <a:srgbClr val="FFC000"/>
+              </a:solidFill>
+            </a:endParaRPr>
+          </a:p>
+        </p:txBody>
+      </p:sp>
+      <p:sp>
+        <p:nvSpPr>
+          <p:cNvPr id="53" name="Rectangle 52"/>
+          <p:cNvSpPr/>
+          <p:nvPr/>
+        </p:nvSpPr>
+        <p:spPr>
+          <a:xfrm>
+            <a:off x="3563888" y="116632"/>
+            <a:ext cx="1728192" cy="600634"/>
+          </a:xfrm>
+          <a:prstGeom prst="rect">
+            <a:avLst/>
+          </a:prstGeom>
+        </p:spPr>
+        <p:style>
+          <a:lnRef idx="2">
+            <a:schemeClr val="accent1">
+              <a:shade val="50000"/>
+            </a:schemeClr>
+          </a:lnRef>
+          <a:fillRef idx="1">
+            <a:schemeClr val="accent1"/>
+          </a:fillRef>
+          <a:effectRef idx="0">
+            <a:schemeClr val="accent1"/>
+          </a:effectRef>
+          <a:fontRef idx="minor">
+            <a:schemeClr val="lt1"/>
+          </a:fontRef>
+        </p:style>
+        <p:txBody>
+          <a:bodyPr rtlCol="0" anchor="ctr"/>
+          <a:lstStyle/>
+          <a:p>
+            <a:pPr algn="ctr"/>
+            <a:r>
+              <a:rPr lang="en-GB" sz="1600" dirty="0" smtClean="0"/>
+              <a:t>Lease</a:t>
+            </a:r>
+            <a:endParaRPr lang="en-GB" sz="1600" dirty="0"/>
+          </a:p>
+        </p:txBody>
+      </p:sp>
+      <p:sp>
+        <p:nvSpPr>
+          <p:cNvPr id="54" name="Rectangle 53"/>
+          <p:cNvSpPr/>
+          <p:nvPr/>
+        </p:nvSpPr>
+        <p:spPr>
+          <a:xfrm>
+            <a:off x="2123728" y="836712"/>
             <a:ext cx="1728192" cy="600634"/>
           </a:xfrm>
           <a:prstGeom prst="rect">
@@ -5335,23 +5389,27 @@
           <a:p>
             <a:pPr algn="ctr"/>
             <a:r>
+              <a:rPr lang="en-GB" sz="1600" dirty="0" err="1" smtClean="0"/>
+              <a:t>LeaseItem</a:t>
+            </a:r>
+            <a:r>
               <a:rPr lang="en-GB" sz="1600" dirty="0" smtClean="0"/>
-              <a:t>Q2 </a:t>
+              <a:t/>
+            </a:r>
+            <a:br>
+              <a:rPr lang="en-GB" sz="1600" dirty="0" smtClean="0"/>
+            </a:br>
+            <a:r>
+              <a:rPr lang="en-GB" sz="1600" dirty="0" smtClean="0"/>
+              <a:t>(</a:t>
             </a:r>
             <a:r>
               <a:rPr lang="en-GB" sz="1600" dirty="0" err="1" smtClean="0"/>
-              <a:t>LeaseTerm</a:t>
-            </a:r>
-            <a:r>
-              <a:rPr lang="en-GB" sz="1600" dirty="0"/>
-              <a:t/>
-            </a:r>
-            <a:br>
-              <a:rPr lang="en-GB" sz="1600" dirty="0"/>
-            </a:br>
-            <a:r>
-              <a:rPr lang="en-GB" sz="1600" dirty="0" err="1"/>
-              <a:t>ForIndexableRent</a:t>
+              <a:t>indexable</a:t>
+            </a:r>
+            <a:r>
+              <a:rPr lang="en-GB" sz="1600" dirty="0" smtClean="0"/>
+              <a:t> rent)</a:t>
             </a:r>
             <a:endParaRPr lang="en-GB" sz="1600" dirty="0"/>
           </a:p>
@@ -5359,19 +5417,18 @@
       </p:sp>
       <p:sp>
         <p:nvSpPr>
-          <p:cNvPr id="33" name="Rectangle 32"/>
+          <p:cNvPr id="55" name="Rectangle 54"/>
           <p:cNvSpPr/>
           <p:nvPr/>
         </p:nvSpPr>
         <p:spPr>
           <a:xfrm>
-            <a:off x="4860032" y="2348880"/>
+            <a:off x="5076056" y="836712"/>
             <a:ext cx="1728192" cy="600634"/>
           </a:xfrm>
           <a:prstGeom prst="rect">
             <a:avLst/>
           </a:prstGeom>
-          <a:ln/>
         </p:spPr>
         <p:style>
           <a:lnRef idx="2">
@@ -5395,12 +5452,8 @@
           <a:p>
             <a:pPr algn="ctr"/>
             <a:r>
-              <a:rPr lang="en-GB" sz="1600" dirty="0" smtClean="0"/>
-              <a:t>Q3 </a:t>
-            </a:r>
-            <a:r>
-              <a:rPr lang="en-GB" sz="1600" dirty="0" err="1" smtClean="0"/>
-              <a:t>LeaseTerm</a:t>
+              <a:rPr lang="en-GB" sz="1600" dirty="0" err="1"/>
+              <a:t>LeaseItem</a:t>
             </a:r>
             <a:r>
               <a:rPr lang="en-GB" sz="1600" dirty="0"/>
@@ -5410,23 +5463,78 @@
               <a:rPr lang="en-GB" sz="1600" dirty="0"/>
             </a:br>
             <a:r>
-              <a:rPr lang="en-GB" sz="1600" dirty="0" err="1" smtClean="0"/>
-              <a:t>ForServiceCharge</a:t>
-            </a:r>
-            <a:endParaRPr lang="en-GB" sz="1600" dirty="0"/>
-          </a:p>
-        </p:txBody>
-      </p:sp>
-      <p:sp>
-        <p:nvSpPr>
-          <p:cNvPr id="34" name="Rectangle 33"/>
+              <a:rPr lang="en-GB" sz="1600" dirty="0"/>
+              <a:t>(service charge)</a:t>
+            </a:r>
+          </a:p>
+        </p:txBody>
+      </p:sp>
+      <p:sp>
+        <p:nvSpPr>
+          <p:cNvPr id="56" name="Rectangle 55"/>
           <p:cNvSpPr/>
           <p:nvPr/>
         </p:nvSpPr>
         <p:spPr>
           <a:xfrm>
-            <a:off x="323528" y="4797152"/>
-            <a:ext cx="1728192" cy="600634"/>
+            <a:off x="323528" y="1628800"/>
+            <a:ext cx="8424936" cy="600634"/>
+          </a:xfrm>
+          <a:prstGeom prst="rect">
+            <a:avLst/>
+          </a:prstGeom>
+          <a:ln/>
+        </p:spPr>
+        <p:style>
+          <a:lnRef idx="2">
+            <a:schemeClr val="accent3">
+              <a:shade val="50000"/>
+            </a:schemeClr>
+          </a:lnRef>
+          <a:fillRef idx="1">
+            <a:schemeClr val="accent3"/>
+          </a:fillRef>
+          <a:effectRef idx="0">
+            <a:schemeClr val="accent3"/>
+          </a:effectRef>
+          <a:fontRef idx="minor">
+            <a:schemeClr val="lt1"/>
+          </a:fontRef>
+        </p:style>
+        <p:txBody>
+          <a:bodyPr rtlCol="0" anchor="ctr"/>
+          <a:lstStyle/>
+          <a:p>
+            <a:pPr algn="ctr"/>
+            <a:r>
+              <a:rPr lang="en-GB" sz="1600" dirty="0" err="1" smtClean="0"/>
+              <a:t>LeaseTerm</a:t>
+            </a:r>
+            <a:r>
+              <a:rPr lang="en-GB" sz="1600" dirty="0"/>
+              <a:t/>
+            </a:r>
+            <a:br>
+              <a:rPr lang="en-GB" sz="1600" dirty="0"/>
+            </a:br>
+            <a:r>
+              <a:rPr lang="en-GB" sz="1600" dirty="0" err="1"/>
+              <a:t>ForIndexableRent</a:t>
+            </a:r>
+            <a:endParaRPr lang="en-GB" sz="1600" dirty="0"/>
+          </a:p>
+        </p:txBody>
+      </p:sp>
+      <p:sp>
+        <p:nvSpPr>
+          <p:cNvPr id="57" name="Rectangle 56"/>
+          <p:cNvSpPr/>
+          <p:nvPr/>
+        </p:nvSpPr>
+        <p:spPr>
+          <a:xfrm>
+            <a:off x="323528" y="2348880"/>
+            <a:ext cx="8424936" cy="600634"/>
           </a:xfrm>
           <a:prstGeom prst="rect">
             <a:avLst/>
@@ -5456,570 +5564,20 @@
             <a:pPr algn="ctr"/>
             <a:r>
               <a:rPr lang="en-GB" sz="1600" dirty="0" err="1" smtClean="0"/>
-              <a:t>InvoiceItem</a:t>
-            </a:r>
-            <a:r>
-              <a:rPr lang="en-GB" sz="1600" dirty="0" smtClean="0"/>
+              <a:t>LeaseTerm</a:t>
+            </a:r>
+            <a:r>
+              <a:rPr lang="en-GB" sz="1600" dirty="0"/>
               <a:t/>
             </a:r>
             <a:br>
-              <a:rPr lang="en-GB" sz="1600" dirty="0" smtClean="0"/>
+              <a:rPr lang="en-GB" sz="1600" dirty="0"/>
             </a:br>
             <a:r>
-              <a:rPr lang="en-GB" sz="1400" dirty="0" smtClean="0"/>
-              <a:t>for Q1 </a:t>
-            </a:r>
-            <a:r>
-              <a:rPr lang="en-GB" sz="1400" dirty="0" err="1" smtClean="0"/>
-              <a:t>ServiceCharge</a:t>
+              <a:rPr lang="en-GB" sz="1600" dirty="0" err="1" smtClean="0"/>
+              <a:t>ForServiceCharge</a:t>
             </a:r>
             <a:endParaRPr lang="en-GB" sz="1600" dirty="0"/>
-          </a:p>
-        </p:txBody>
-      </p:sp>
-      <p:sp>
-        <p:nvSpPr>
-          <p:cNvPr id="35" name="Rectangle 34"/>
-          <p:cNvSpPr/>
-          <p:nvPr/>
-        </p:nvSpPr>
-        <p:spPr>
-          <a:xfrm>
-            <a:off x="2699792" y="3861048"/>
-            <a:ext cx="1728192" cy="600634"/>
-          </a:xfrm>
-          <a:prstGeom prst="rect">
-            <a:avLst/>
-          </a:prstGeom>
-          <a:ln/>
-        </p:spPr>
-        <p:style>
-          <a:lnRef idx="2">
-            <a:schemeClr val="accent3">
-              <a:shade val="50000"/>
-            </a:schemeClr>
-          </a:lnRef>
-          <a:fillRef idx="1">
-            <a:schemeClr val="accent3"/>
-          </a:fillRef>
-          <a:effectRef idx="0">
-            <a:schemeClr val="accent3"/>
-          </a:effectRef>
-          <a:fontRef idx="minor">
-            <a:schemeClr val="lt1"/>
-          </a:fontRef>
-        </p:style>
-        <p:txBody>
-          <a:bodyPr rtlCol="0" anchor="ctr"/>
-          <a:lstStyle/>
-          <a:p>
-            <a:pPr algn="ctr"/>
-            <a:r>
-              <a:rPr lang="en-GB" sz="1600" dirty="0" err="1" smtClean="0"/>
-              <a:t>InvoiceItem</a:t>
-            </a:r>
-            <a:r>
-              <a:rPr lang="en-GB" sz="1600" dirty="0" smtClean="0"/>
-              <a:t/>
-            </a:r>
-            <a:br>
-              <a:rPr lang="en-GB" sz="1600" dirty="0" smtClean="0"/>
-            </a:br>
-            <a:r>
-              <a:rPr lang="en-GB" sz="1400" dirty="0" smtClean="0"/>
-              <a:t>for Q2 </a:t>
-            </a:r>
-            <a:r>
-              <a:rPr lang="en-GB" sz="1400" dirty="0" err="1" smtClean="0"/>
-              <a:t>IndexableRent</a:t>
-            </a:r>
-            <a:endParaRPr lang="en-GB" sz="1600" dirty="0"/>
-          </a:p>
-        </p:txBody>
-      </p:sp>
-      <p:sp>
-        <p:nvSpPr>
-          <p:cNvPr id="36" name="Rectangle 35"/>
-          <p:cNvSpPr/>
-          <p:nvPr/>
-        </p:nvSpPr>
-        <p:spPr>
-          <a:xfrm>
-            <a:off x="2699792" y="4797152"/>
-            <a:ext cx="1728192" cy="600634"/>
-          </a:xfrm>
-          <a:prstGeom prst="rect">
-            <a:avLst/>
-          </a:prstGeom>
-          <a:ln/>
-        </p:spPr>
-        <p:style>
-          <a:lnRef idx="2">
-            <a:schemeClr val="accent4">
-              <a:shade val="50000"/>
-            </a:schemeClr>
-          </a:lnRef>
-          <a:fillRef idx="1">
-            <a:schemeClr val="accent4"/>
-          </a:fillRef>
-          <a:effectRef idx="0">
-            <a:schemeClr val="accent4"/>
-          </a:effectRef>
-          <a:fontRef idx="minor">
-            <a:schemeClr val="lt1"/>
-          </a:fontRef>
-        </p:style>
-        <p:txBody>
-          <a:bodyPr rtlCol="0" anchor="ctr"/>
-          <a:lstStyle/>
-          <a:p>
-            <a:pPr algn="ctr"/>
-            <a:r>
-              <a:rPr lang="en-GB" sz="1600" dirty="0" err="1" smtClean="0"/>
-              <a:t>InvoiceItem</a:t>
-            </a:r>
-            <a:r>
-              <a:rPr lang="en-GB" sz="1600" dirty="0" smtClean="0"/>
-              <a:t/>
-            </a:r>
-            <a:br>
-              <a:rPr lang="en-GB" sz="1600" dirty="0" smtClean="0"/>
-            </a:br>
-            <a:r>
-              <a:rPr lang="en-GB" sz="1400" dirty="0" smtClean="0"/>
-              <a:t>for Q2 </a:t>
-            </a:r>
-            <a:r>
-              <a:rPr lang="en-GB" sz="1400" dirty="0" err="1" smtClean="0"/>
-              <a:t>ServiceCharge</a:t>
-            </a:r>
-            <a:endParaRPr lang="en-GB" sz="1600" dirty="0"/>
-          </a:p>
-        </p:txBody>
-      </p:sp>
-      <p:sp>
-        <p:nvSpPr>
-          <p:cNvPr id="37" name="Rectangle 36"/>
-          <p:cNvSpPr/>
-          <p:nvPr/>
-        </p:nvSpPr>
-        <p:spPr>
-          <a:xfrm>
-            <a:off x="4860032" y="3861048"/>
-            <a:ext cx="1728192" cy="600634"/>
-          </a:xfrm>
-          <a:prstGeom prst="rect">
-            <a:avLst/>
-          </a:prstGeom>
-          <a:ln/>
-        </p:spPr>
-        <p:style>
-          <a:lnRef idx="2">
-            <a:schemeClr val="accent3">
-              <a:shade val="50000"/>
-            </a:schemeClr>
-          </a:lnRef>
-          <a:fillRef idx="1">
-            <a:schemeClr val="accent3"/>
-          </a:fillRef>
-          <a:effectRef idx="0">
-            <a:schemeClr val="accent3"/>
-          </a:effectRef>
-          <a:fontRef idx="minor">
-            <a:schemeClr val="lt1"/>
-          </a:fontRef>
-        </p:style>
-        <p:txBody>
-          <a:bodyPr rtlCol="0" anchor="ctr"/>
-          <a:lstStyle/>
-          <a:p>
-            <a:pPr algn="ctr"/>
-            <a:r>
-              <a:rPr lang="en-GB" sz="1600" dirty="0" err="1" smtClean="0"/>
-              <a:t>InvoiceItem</a:t>
-            </a:r>
-            <a:r>
-              <a:rPr lang="en-GB" sz="1600" dirty="0" smtClean="0"/>
-              <a:t/>
-            </a:r>
-            <a:br>
-              <a:rPr lang="en-GB" sz="1600" dirty="0" smtClean="0"/>
-            </a:br>
-            <a:r>
-              <a:rPr lang="en-GB" sz="1400" dirty="0" smtClean="0"/>
-              <a:t>for Q3 </a:t>
-            </a:r>
-            <a:r>
-              <a:rPr lang="en-GB" sz="1400" dirty="0" err="1" smtClean="0"/>
-              <a:t>IndexableRent</a:t>
-            </a:r>
-            <a:endParaRPr lang="en-GB" sz="1600" dirty="0"/>
-          </a:p>
-        </p:txBody>
-      </p:sp>
-      <p:sp>
-        <p:nvSpPr>
-          <p:cNvPr id="38" name="Rectangle 37"/>
-          <p:cNvSpPr/>
-          <p:nvPr/>
-        </p:nvSpPr>
-        <p:spPr>
-          <a:xfrm>
-            <a:off x="4860032" y="4797152"/>
-            <a:ext cx="1728192" cy="600634"/>
-          </a:xfrm>
-          <a:prstGeom prst="rect">
-            <a:avLst/>
-          </a:prstGeom>
-          <a:ln/>
-        </p:spPr>
-        <p:style>
-          <a:lnRef idx="2">
-            <a:schemeClr val="accent4">
-              <a:shade val="50000"/>
-            </a:schemeClr>
-          </a:lnRef>
-          <a:fillRef idx="1">
-            <a:schemeClr val="accent4"/>
-          </a:fillRef>
-          <a:effectRef idx="0">
-            <a:schemeClr val="accent4"/>
-          </a:effectRef>
-          <a:fontRef idx="minor">
-            <a:schemeClr val="lt1"/>
-          </a:fontRef>
-        </p:style>
-        <p:txBody>
-          <a:bodyPr rtlCol="0" anchor="ctr"/>
-          <a:lstStyle/>
-          <a:p>
-            <a:pPr algn="ctr"/>
-            <a:r>
-              <a:rPr lang="en-GB" sz="1600" dirty="0" err="1" smtClean="0"/>
-              <a:t>InvoiceItem</a:t>
-            </a:r>
-            <a:r>
-              <a:rPr lang="en-GB" sz="1600" dirty="0" smtClean="0"/>
-              <a:t/>
-            </a:r>
-            <a:br>
-              <a:rPr lang="en-GB" sz="1600" dirty="0" smtClean="0"/>
-            </a:br>
-            <a:r>
-              <a:rPr lang="en-GB" sz="1400" dirty="0" smtClean="0"/>
-              <a:t>for Q3 </a:t>
-            </a:r>
-            <a:r>
-              <a:rPr lang="en-GB" sz="1400" dirty="0" err="1" smtClean="0"/>
-              <a:t>ServiceCharge</a:t>
-            </a:r>
-            <a:endParaRPr lang="en-GB" sz="1600" dirty="0"/>
-          </a:p>
-        </p:txBody>
-      </p:sp>
-      <p:sp>
-        <p:nvSpPr>
-          <p:cNvPr id="39" name="Rectangle 38"/>
-          <p:cNvSpPr/>
-          <p:nvPr/>
-        </p:nvSpPr>
-        <p:spPr>
-          <a:xfrm>
-            <a:off x="467544" y="4424125"/>
-            <a:ext cx="1728192" cy="469605"/>
-          </a:xfrm>
-          <a:prstGeom prst="rect">
-            <a:avLst/>
-          </a:prstGeom>
-          <a:ln/>
-        </p:spPr>
-        <p:style>
-          <a:lnRef idx="2">
-            <a:schemeClr val="accent5">
-              <a:shade val="50000"/>
-            </a:schemeClr>
-          </a:lnRef>
-          <a:fillRef idx="1">
-            <a:schemeClr val="accent5"/>
-          </a:fillRef>
-          <a:effectRef idx="0">
-            <a:schemeClr val="accent5"/>
-          </a:effectRef>
-          <a:fontRef idx="minor">
-            <a:schemeClr val="lt1"/>
-          </a:fontRef>
-        </p:style>
-        <p:txBody>
-          <a:bodyPr rtlCol="0" anchor="ctr"/>
-          <a:lstStyle/>
-          <a:p>
-            <a:pPr algn="ctr"/>
-            <a:r>
-              <a:rPr lang="en-GB" sz="1600" dirty="0" smtClean="0"/>
-              <a:t>Invoice for Q1</a:t>
-            </a:r>
-            <a:br>
-              <a:rPr lang="en-GB" sz="1600" dirty="0" smtClean="0"/>
-            </a:br>
-            <a:r>
-              <a:rPr lang="en-GB" sz="1200" dirty="0" smtClean="0"/>
-              <a:t>(approved)</a:t>
-            </a:r>
-            <a:endParaRPr lang="en-GB" sz="1600" dirty="0"/>
-          </a:p>
-        </p:txBody>
-      </p:sp>
-      <p:sp>
-        <p:nvSpPr>
-          <p:cNvPr id="40" name="Rectangle 39"/>
-          <p:cNvSpPr/>
-          <p:nvPr/>
-        </p:nvSpPr>
-        <p:spPr>
-          <a:xfrm>
-            <a:off x="2843808" y="4425193"/>
-            <a:ext cx="1728192" cy="469605"/>
-          </a:xfrm>
-          <a:prstGeom prst="rect">
-            <a:avLst/>
-          </a:prstGeom>
-          <a:ln/>
-        </p:spPr>
-        <p:style>
-          <a:lnRef idx="2">
-            <a:schemeClr val="accent5">
-              <a:shade val="50000"/>
-            </a:schemeClr>
-          </a:lnRef>
-          <a:fillRef idx="1">
-            <a:schemeClr val="accent5"/>
-          </a:fillRef>
-          <a:effectRef idx="0">
-            <a:schemeClr val="accent5"/>
-          </a:effectRef>
-          <a:fontRef idx="minor">
-            <a:schemeClr val="lt1"/>
-          </a:fontRef>
-        </p:style>
-        <p:txBody>
-          <a:bodyPr rtlCol="0" anchor="ctr"/>
-          <a:lstStyle/>
-          <a:p>
-            <a:pPr algn="ctr"/>
-            <a:r>
-              <a:rPr lang="en-GB" sz="1600" dirty="0" smtClean="0"/>
-              <a:t>Invoice for Q2</a:t>
-            </a:r>
-            <a:br>
-              <a:rPr lang="en-GB" sz="1600" dirty="0" smtClean="0"/>
-            </a:br>
-            <a:r>
-              <a:rPr lang="en-GB" sz="1200" dirty="0" smtClean="0"/>
-              <a:t>(approved)</a:t>
-            </a:r>
-            <a:endParaRPr lang="en-GB" sz="1600" dirty="0"/>
-          </a:p>
-        </p:txBody>
-      </p:sp>
-      <p:sp>
-        <p:nvSpPr>
-          <p:cNvPr id="41" name="Rectangle 40"/>
-          <p:cNvSpPr/>
-          <p:nvPr/>
-        </p:nvSpPr>
-        <p:spPr>
-          <a:xfrm>
-            <a:off x="5004048" y="4416647"/>
-            <a:ext cx="1728192" cy="469605"/>
-          </a:xfrm>
-          <a:prstGeom prst="rect">
-            <a:avLst/>
-          </a:prstGeom>
-          <a:ln/>
-        </p:spPr>
-        <p:style>
-          <a:lnRef idx="2">
-            <a:schemeClr val="accent5">
-              <a:shade val="50000"/>
-            </a:schemeClr>
-          </a:lnRef>
-          <a:fillRef idx="1">
-            <a:schemeClr val="accent5"/>
-          </a:fillRef>
-          <a:effectRef idx="0">
-            <a:schemeClr val="accent5"/>
-          </a:effectRef>
-          <a:fontRef idx="minor">
-            <a:schemeClr val="lt1"/>
-          </a:fontRef>
-        </p:style>
-        <p:txBody>
-          <a:bodyPr rtlCol="0" anchor="ctr"/>
-          <a:lstStyle/>
-          <a:p>
-            <a:pPr algn="ctr"/>
-            <a:r>
-              <a:rPr lang="en-GB" sz="1600" dirty="0" smtClean="0"/>
-              <a:t>Invoice for Q3</a:t>
-            </a:r>
-            <a:br>
-              <a:rPr lang="en-GB" sz="1600" dirty="0" smtClean="0"/>
-            </a:br>
-            <a:r>
-              <a:rPr lang="en-GB" sz="1200" dirty="0" smtClean="0"/>
-              <a:t>(new)</a:t>
-            </a:r>
-            <a:endParaRPr lang="en-GB" sz="1600" dirty="0"/>
-          </a:p>
-        </p:txBody>
-      </p:sp>
-      <p:sp>
-        <p:nvSpPr>
-          <p:cNvPr id="42" name="Rectangle 41"/>
-          <p:cNvSpPr/>
-          <p:nvPr/>
-        </p:nvSpPr>
-        <p:spPr>
-          <a:xfrm>
-            <a:off x="2699792" y="5996718"/>
-            <a:ext cx="1728192" cy="600634"/>
-          </a:xfrm>
-          <a:prstGeom prst="rect">
-            <a:avLst/>
-          </a:prstGeom>
-          <a:ln/>
-        </p:spPr>
-        <p:style>
-          <a:lnRef idx="2">
-            <a:schemeClr val="accent4">
-              <a:shade val="50000"/>
-            </a:schemeClr>
-          </a:lnRef>
-          <a:fillRef idx="1">
-            <a:schemeClr val="accent4"/>
-          </a:fillRef>
-          <a:effectRef idx="0">
-            <a:schemeClr val="accent4"/>
-          </a:effectRef>
-          <a:fontRef idx="minor">
-            <a:schemeClr val="lt1"/>
-          </a:fontRef>
-        </p:style>
-        <p:txBody>
-          <a:bodyPr rtlCol="0" anchor="ctr"/>
-          <a:lstStyle/>
-          <a:p>
-            <a:pPr algn="ctr"/>
-            <a:r>
-              <a:rPr lang="en-GB" sz="1600" dirty="0" err="1" smtClean="0"/>
-              <a:t>InvoiceItem</a:t>
-            </a:r>
-            <a:r>
-              <a:rPr lang="en-GB" sz="1600" dirty="0" smtClean="0"/>
-              <a:t/>
-            </a:r>
-            <a:br>
-              <a:rPr lang="en-GB" sz="1600" dirty="0" smtClean="0"/>
-            </a:br>
-            <a:r>
-              <a:rPr lang="en-GB" sz="1400" dirty="0" smtClean="0"/>
-              <a:t>for Q2 </a:t>
-            </a:r>
-            <a:r>
-              <a:rPr lang="en-GB" sz="1400" dirty="0" err="1" smtClean="0"/>
-              <a:t>ServiceCharge</a:t>
-            </a:r>
-            <a:endParaRPr lang="en-GB" sz="1600" dirty="0"/>
-          </a:p>
-        </p:txBody>
-      </p:sp>
-      <p:sp>
-        <p:nvSpPr>
-          <p:cNvPr id="43" name="Rectangle 42"/>
-          <p:cNvSpPr/>
-          <p:nvPr/>
-        </p:nvSpPr>
-        <p:spPr>
-          <a:xfrm>
-            <a:off x="2843808" y="5624759"/>
-            <a:ext cx="1728192" cy="469605"/>
-          </a:xfrm>
-          <a:prstGeom prst="rect">
-            <a:avLst/>
-          </a:prstGeom>
-          <a:ln/>
-        </p:spPr>
-        <p:style>
-          <a:lnRef idx="2">
-            <a:schemeClr val="accent5">
-              <a:shade val="50000"/>
-            </a:schemeClr>
-          </a:lnRef>
-          <a:fillRef idx="1">
-            <a:schemeClr val="accent5"/>
-          </a:fillRef>
-          <a:effectRef idx="0">
-            <a:schemeClr val="accent5"/>
-          </a:effectRef>
-          <a:fontRef idx="minor">
-            <a:schemeClr val="lt1"/>
-          </a:fontRef>
-        </p:style>
-        <p:txBody>
-          <a:bodyPr rtlCol="0" anchor="ctr"/>
-          <a:lstStyle/>
-          <a:p>
-            <a:pPr algn="ctr"/>
-            <a:r>
-              <a:rPr lang="en-GB" sz="1600" dirty="0" smtClean="0"/>
-              <a:t>Invoice for Q2</a:t>
-            </a:r>
-            <a:br>
-              <a:rPr lang="en-GB" sz="1600" dirty="0" smtClean="0"/>
-            </a:br>
-            <a:r>
-              <a:rPr lang="en-GB" sz="1200" dirty="0" smtClean="0"/>
-              <a:t>(new)</a:t>
-            </a:r>
-            <a:endParaRPr lang="en-GB" sz="1600" dirty="0"/>
-          </a:p>
-        </p:txBody>
-      </p:sp>
-      <p:sp>
-        <p:nvSpPr>
-          <p:cNvPr id="44" name="TextBox 43"/>
-          <p:cNvSpPr txBox="1"/>
-          <p:nvPr/>
-        </p:nvSpPr>
-        <p:spPr>
-          <a:xfrm>
-            <a:off x="4699545" y="6300028"/>
-            <a:ext cx="592535" cy="369332"/>
-          </a:xfrm>
-          <a:prstGeom prst="rect">
-            <a:avLst/>
-          </a:prstGeom>
-          <a:noFill/>
-        </p:spPr>
-        <p:txBody>
-          <a:bodyPr wrap="none" rtlCol="0">
-            <a:spAutoFit/>
-          </a:bodyPr>
-          <a:lstStyle/>
-          <a:p>
-            <a:r>
-              <a:rPr lang="en-GB" dirty="0" smtClean="0">
-                <a:solidFill>
-                  <a:srgbClr val="FF0000"/>
-                </a:solidFill>
-              </a:rPr>
-              <a:t>now</a:t>
-            </a:r>
-            <a:endParaRPr lang="en-GB" dirty="0">
-              <a:solidFill>
-                <a:srgbClr val="FF0000"/>
-              </a:solidFill>
-            </a:endParaRPr>
           </a:p>
         </p:txBody>
       </p:sp>
@@ -6031,8 +5589,8 @@
         </p:nvCxnSpPr>
         <p:spPr>
           <a:xfrm flipV="1">
-            <a:off x="4716016" y="1691516"/>
-            <a:ext cx="0" cy="4896544"/>
+            <a:off x="4716016" y="3140968"/>
+            <a:ext cx="0" cy="3447092"/>
           </a:xfrm>
           <a:prstGeom prst="line">
             <a:avLst/>
@@ -6058,60 +5616,6 @@
           </a:fontRef>
         </p:style>
       </p:cxnSp>
-      <p:sp>
-        <p:nvSpPr>
-          <p:cNvPr id="46" name="TextBox 45"/>
-          <p:cNvSpPr txBox="1"/>
-          <p:nvPr/>
-        </p:nvSpPr>
-        <p:spPr>
-          <a:xfrm>
-            <a:off x="1412194" y="6011996"/>
-            <a:ext cx="1045543" cy="646331"/>
-          </a:xfrm>
-          <a:prstGeom prst="rect">
-            <a:avLst/>
-          </a:prstGeom>
-          <a:noFill/>
-        </p:spPr>
-        <p:txBody>
-          <a:bodyPr wrap="none" rtlCol="0">
-            <a:spAutoFit/>
-          </a:bodyPr>
-          <a:lstStyle/>
-          <a:p>
-            <a:pPr algn="r"/>
-            <a:r>
-              <a:rPr lang="en-GB" dirty="0" smtClean="0">
-                <a:solidFill>
-                  <a:srgbClr val="FFC000"/>
-                </a:solidFill>
-              </a:rPr>
-              <a:t>retro-run</a:t>
-            </a:r>
-            <a:br>
-              <a:rPr lang="en-GB" dirty="0" smtClean="0">
-                <a:solidFill>
-                  <a:srgbClr val="FFC000"/>
-                </a:solidFill>
-              </a:rPr>
-            </a:br>
-            <a:r>
-              <a:rPr lang="en-GB" dirty="0" smtClean="0">
-                <a:solidFill>
-                  <a:srgbClr val="FFC000"/>
-                </a:solidFill>
-              </a:rPr>
-              <a:t>from</a:t>
-            </a:r>
-            <a:endParaRPr lang="en-GB" dirty="0">
-              <a:solidFill>
-                <a:srgbClr val="FFC000"/>
-              </a:solidFill>
-            </a:endParaRPr>
-          </a:p>
-        </p:txBody>
-      </p:sp>
       <p:cxnSp>
         <p:nvCxnSpPr>
           <p:cNvPr id="47" name="Straight Connector 46"/>
@@ -6120,8 +5624,8 @@
         </p:nvCxnSpPr>
         <p:spPr>
           <a:xfrm flipV="1">
-            <a:off x="2436777" y="1691516"/>
-            <a:ext cx="0" cy="4896544"/>
+            <a:off x="2436777" y="3140968"/>
+            <a:ext cx="0" cy="3447092"/>
           </a:xfrm>
           <a:prstGeom prst="line">
             <a:avLst/>

</xml_diff>

<commit_message>
Minor changes to audibility docs
</commit_message>
<xml_diff>
--- a/adocs/documentation/src/main/pptx/LeaseTermAndInvoiceItems.pptx
+++ b/adocs/documentation/src/main/pptx/LeaseTermAndInvoiceItems.pptx
@@ -105,6 +105,22 @@
       </a:defRPr>
     </a:lvl9pPr>
   </p:defaultTextStyle>
+  <p:extLst>
+    <p:ext uri="{EFAFB233-063F-42B5-8137-9DF3F51BA10A}">
+      <p15:sldGuideLst xmlns:p15="http://schemas.microsoft.com/office/powerpoint/2012/main">
+        <p15:guide id="1" orient="horz" pos="2160">
+          <p15:clr>
+            <a:srgbClr val="A4A3A4"/>
+          </p15:clr>
+        </p15:guide>
+        <p15:guide id="2" pos="2880">
+          <p15:clr>
+            <a:srgbClr val="A4A3A4"/>
+          </p15:clr>
+        </p15:guide>
+      </p15:sldGuideLst>
+    </p:ext>
+  </p:extLst>
 </p:presentation>
 </file>
 
@@ -289,7 +305,7 @@
           <a:p>
             <a:fld id="{8E844227-6E00-4FE0-991D-833A75065FC2}" type="datetimeFigureOut">
               <a:rPr lang="en-GB" smtClean="0"/>
-              <a:t>14/04/2015</a:t>
+              <a:t>20/04/2015</a:t>
             </a:fld>
             <a:endParaRPr lang="en-GB"/>
           </a:p>
@@ -459,7 +475,7 @@
           <a:p>
             <a:fld id="{8E844227-6E00-4FE0-991D-833A75065FC2}" type="datetimeFigureOut">
               <a:rPr lang="en-GB" smtClean="0"/>
-              <a:t>14/04/2015</a:t>
+              <a:t>20/04/2015</a:t>
             </a:fld>
             <a:endParaRPr lang="en-GB"/>
           </a:p>
@@ -639,7 +655,7 @@
           <a:p>
             <a:fld id="{8E844227-6E00-4FE0-991D-833A75065FC2}" type="datetimeFigureOut">
               <a:rPr lang="en-GB" smtClean="0"/>
-              <a:t>14/04/2015</a:t>
+              <a:t>20/04/2015</a:t>
             </a:fld>
             <a:endParaRPr lang="en-GB"/>
           </a:p>
@@ -809,7 +825,7 @@
           <a:p>
             <a:fld id="{8E844227-6E00-4FE0-991D-833A75065FC2}" type="datetimeFigureOut">
               <a:rPr lang="en-GB" smtClean="0"/>
-              <a:t>14/04/2015</a:t>
+              <a:t>20/04/2015</a:t>
             </a:fld>
             <a:endParaRPr lang="en-GB"/>
           </a:p>
@@ -1055,7 +1071,7 @@
           <a:p>
             <a:fld id="{8E844227-6E00-4FE0-991D-833A75065FC2}" type="datetimeFigureOut">
               <a:rPr lang="en-GB" smtClean="0"/>
-              <a:t>14/04/2015</a:t>
+              <a:t>20/04/2015</a:t>
             </a:fld>
             <a:endParaRPr lang="en-GB"/>
           </a:p>
@@ -1343,7 +1359,7 @@
           <a:p>
             <a:fld id="{8E844227-6E00-4FE0-991D-833A75065FC2}" type="datetimeFigureOut">
               <a:rPr lang="en-GB" smtClean="0"/>
-              <a:t>14/04/2015</a:t>
+              <a:t>20/04/2015</a:t>
             </a:fld>
             <a:endParaRPr lang="en-GB"/>
           </a:p>
@@ -1765,7 +1781,7 @@
           <a:p>
             <a:fld id="{8E844227-6E00-4FE0-991D-833A75065FC2}" type="datetimeFigureOut">
               <a:rPr lang="en-GB" smtClean="0"/>
-              <a:t>14/04/2015</a:t>
+              <a:t>20/04/2015</a:t>
             </a:fld>
             <a:endParaRPr lang="en-GB"/>
           </a:p>
@@ -1883,7 +1899,7 @@
           <a:p>
             <a:fld id="{8E844227-6E00-4FE0-991D-833A75065FC2}" type="datetimeFigureOut">
               <a:rPr lang="en-GB" smtClean="0"/>
-              <a:t>14/04/2015</a:t>
+              <a:t>20/04/2015</a:t>
             </a:fld>
             <a:endParaRPr lang="en-GB"/>
           </a:p>
@@ -1978,7 +1994,7 @@
           <a:p>
             <a:fld id="{8E844227-6E00-4FE0-991D-833A75065FC2}" type="datetimeFigureOut">
               <a:rPr lang="en-GB" smtClean="0"/>
-              <a:t>14/04/2015</a:t>
+              <a:t>20/04/2015</a:t>
             </a:fld>
             <a:endParaRPr lang="en-GB"/>
           </a:p>
@@ -2255,7 +2271,7 @@
           <a:p>
             <a:fld id="{8E844227-6E00-4FE0-991D-833A75065FC2}" type="datetimeFigureOut">
               <a:rPr lang="en-GB" smtClean="0"/>
-              <a:t>14/04/2015</a:t>
+              <a:t>20/04/2015</a:t>
             </a:fld>
             <a:endParaRPr lang="en-GB"/>
           </a:p>
@@ -2508,7 +2524,7 @@
           <a:p>
             <a:fld id="{8E844227-6E00-4FE0-991D-833A75065FC2}" type="datetimeFigureOut">
               <a:rPr lang="en-GB" smtClean="0"/>
-              <a:t>14/04/2015</a:t>
+              <a:t>20/04/2015</a:t>
             </a:fld>
             <a:endParaRPr lang="en-GB"/>
           </a:p>
@@ -2721,7 +2737,7 @@
           <a:p>
             <a:fld id="{8E844227-6E00-4FE0-991D-833A75065FC2}" type="datetimeFigureOut">
               <a:rPr lang="en-GB" smtClean="0"/>
-              <a:t>14/04/2015</a:t>
+              <a:t>20/04/2015</a:t>
             </a:fld>
             <a:endParaRPr lang="en-GB"/>
           </a:p>
@@ -4993,7 +5009,7 @@
             </a:br>
             <a:r>
               <a:rPr lang="en-GB" sz="1200" dirty="0" smtClean="0"/>
-              <a:t>(approved)</a:t>
+              <a:t>(final)</a:t>
             </a:r>
             <a:endParaRPr lang="en-GB" sz="1600" dirty="0"/>
           </a:p>
@@ -5045,7 +5061,7 @@
             </a:br>
             <a:r>
               <a:rPr lang="en-GB" sz="1200" dirty="0" smtClean="0"/>
-              <a:t>(approved)</a:t>
+              <a:t>(final)</a:t>
             </a:r>
             <a:endParaRPr lang="en-GB" sz="1600" dirty="0"/>
           </a:p>

</xml_diff>